<commit_message>
Switch to Arial font to avoid SVG rendering bug.
</commit_message>
<xml_diff>
--- a/images/pm-quarterly-life.pptx
+++ b/images/pm-quarterly-life.pptx
@@ -3390,6 +3390,8 @@
                     <a:lumMod val="75000"/>
                   </a:schemeClr>
                 </a:solidFill>
+                <a:latin typeface="Arial" panose="020B0604020202020204" pitchFamily="34" charset="0"/>
+                <a:cs typeface="Arial" panose="020B0604020202020204" pitchFamily="34" charset="0"/>
               </a:rPr>
               <a:t>Product Manager</a:t>
             </a:r>
@@ -3403,6 +3405,8 @@
                     <a:lumMod val="75000"/>
                   </a:schemeClr>
                 </a:solidFill>
+                <a:latin typeface="Arial" panose="020B0604020202020204" pitchFamily="34" charset="0"/>
+                <a:cs typeface="Arial" panose="020B0604020202020204" pitchFamily="34" charset="0"/>
               </a:rPr>
               <a:t>Daily Life</a:t>
             </a:r>
@@ -3412,6 +3416,8 @@
                   <a:lumMod val="75000"/>
                 </a:schemeClr>
               </a:solidFill>
+              <a:latin typeface="Arial" panose="020B0604020202020204" pitchFamily="34" charset="0"/>
+              <a:cs typeface="Arial" panose="020B0604020202020204" pitchFamily="34" charset="0"/>
             </a:endParaRPr>
           </a:p>
         </p:txBody>
@@ -3470,6 +3476,8 @@
                     <a:lumMod val="75000"/>
                   </a:schemeClr>
                 </a:solidFill>
+                <a:latin typeface="Arial" panose="020B0604020202020204" pitchFamily="34" charset="0"/>
+                <a:cs typeface="Arial" panose="020B0604020202020204" pitchFamily="34" charset="0"/>
               </a:rPr>
               <a:t>Quarterly Cycle</a:t>
             </a:r>
@@ -3524,6 +3532,8 @@
                 <a:solidFill>
                   <a:sysClr val="windowText" lastClr="000000"/>
                 </a:solidFill>
+                <a:latin typeface="Arial" panose="020B0604020202020204" pitchFamily="34" charset="0"/>
+                <a:cs typeface="Arial" panose="020B0604020202020204" pitchFamily="34" charset="0"/>
               </a:rPr>
               <a:t>Review for priority</a:t>
             </a:r>
@@ -3575,6 +3585,8 @@
                 <a:solidFill>
                   <a:schemeClr val="bg1"/>
                 </a:solidFill>
+                <a:latin typeface="Arial" panose="020B0604020202020204" pitchFamily="34" charset="0"/>
+                <a:cs typeface="Arial" panose="020B0604020202020204" pitchFamily="34" charset="0"/>
               </a:rPr>
               <a:t>1-pager</a:t>
             </a:r>
@@ -3626,6 +3638,8 @@
                 <a:solidFill>
                   <a:schemeClr val="bg1"/>
                 </a:solidFill>
+                <a:latin typeface="Arial" panose="020B0604020202020204" pitchFamily="34" charset="0"/>
+                <a:cs typeface="Arial" panose="020B0604020202020204" pitchFamily="34" charset="0"/>
               </a:rPr>
               <a:t>Feature</a:t>
             </a:r>
@@ -3637,6 +3651,8 @@
                 <a:solidFill>
                   <a:schemeClr val="bg1"/>
                 </a:solidFill>
+                <a:latin typeface="Arial" panose="020B0604020202020204" pitchFamily="34" charset="0"/>
+                <a:cs typeface="Arial" panose="020B0604020202020204" pitchFamily="34" charset="0"/>
               </a:rPr>
               <a:t>Narrative</a:t>
             </a:r>
@@ -3688,6 +3704,8 @@
                 <a:solidFill>
                   <a:schemeClr val="bg1"/>
                 </a:solidFill>
+                <a:latin typeface="Arial" panose="020B0604020202020204" pitchFamily="34" charset="0"/>
+                <a:cs typeface="Arial" panose="020B0604020202020204" pitchFamily="34" charset="0"/>
               </a:rPr>
               <a:t>PRD</a:t>
             </a:r>
@@ -3742,7 +3760,10 @@
           <a:lstStyle/>
           <a:p>
             <a:pPr algn="ctr"/>
-            <a:endParaRPr lang="en-US"/>
+            <a:endParaRPr lang="en-US">
+              <a:latin typeface="Arial" panose="020B0604020202020204" pitchFamily="34" charset="0"/>
+              <a:cs typeface="Arial" panose="020B0604020202020204" pitchFamily="34" charset="0"/>
+            </a:endParaRPr>
           </a:p>
         </p:txBody>
       </p:sp>
@@ -3811,6 +3832,8 @@
                   <a:solidFill>
                     <a:schemeClr val="bg1"/>
                   </a:solidFill>
+                  <a:latin typeface="Arial" panose="020B0604020202020204" pitchFamily="34" charset="0"/>
+                  <a:cs typeface="Arial" panose="020B0604020202020204" pitchFamily="34" charset="0"/>
                 </a:rPr>
                 <a:t>Epic</a:t>
               </a:r>
@@ -3862,6 +3885,8 @@
                   <a:solidFill>
                     <a:schemeClr val="bg1"/>
                   </a:solidFill>
+                  <a:latin typeface="Arial" panose="020B0604020202020204" pitchFamily="34" charset="0"/>
+                  <a:cs typeface="Arial" panose="020B0604020202020204" pitchFamily="34" charset="0"/>
                 </a:rPr>
                 <a:t>Epic</a:t>
               </a:r>
@@ -3913,6 +3938,8 @@
                   <a:solidFill>
                     <a:schemeClr val="bg1"/>
                   </a:solidFill>
+                  <a:latin typeface="Arial" panose="020B0604020202020204" pitchFamily="34" charset="0"/>
+                  <a:cs typeface="Arial" panose="020B0604020202020204" pitchFamily="34" charset="0"/>
                 </a:rPr>
                 <a:t>Epic</a:t>
               </a:r>
@@ -3985,6 +4012,8 @@
                   <a:solidFill>
                     <a:schemeClr val="bg1"/>
                   </a:solidFill>
+                  <a:latin typeface="Arial" panose="020B0604020202020204" pitchFamily="34" charset="0"/>
+                  <a:cs typeface="Arial" panose="020B0604020202020204" pitchFamily="34" charset="0"/>
                 </a:rPr>
                 <a:t>Story</a:t>
               </a:r>
@@ -4036,6 +4065,8 @@
                   <a:solidFill>
                     <a:schemeClr val="bg1"/>
                   </a:solidFill>
+                  <a:latin typeface="Arial" panose="020B0604020202020204" pitchFamily="34" charset="0"/>
+                  <a:cs typeface="Arial" panose="020B0604020202020204" pitchFamily="34" charset="0"/>
                 </a:rPr>
                 <a:t>Story</a:t>
               </a:r>
@@ -4087,6 +4118,8 @@
                   <a:solidFill>
                     <a:schemeClr val="bg1"/>
                   </a:solidFill>
+                  <a:latin typeface="Arial" panose="020B0604020202020204" pitchFamily="34" charset="0"/>
+                  <a:cs typeface="Arial" panose="020B0604020202020204" pitchFamily="34" charset="0"/>
                 </a:rPr>
                 <a:t>Story</a:t>
               </a:r>
@@ -4138,6 +4171,8 @@
                   <a:solidFill>
                     <a:schemeClr val="bg1"/>
                   </a:solidFill>
+                  <a:latin typeface="Arial" panose="020B0604020202020204" pitchFamily="34" charset="0"/>
+                  <a:cs typeface="Arial" panose="020B0604020202020204" pitchFamily="34" charset="0"/>
                 </a:rPr>
                 <a:t>Story</a:t>
               </a:r>
@@ -4189,6 +4224,8 @@
                   <a:solidFill>
                     <a:schemeClr val="bg1"/>
                   </a:solidFill>
+                  <a:latin typeface="Arial" panose="020B0604020202020204" pitchFamily="34" charset="0"/>
+                  <a:cs typeface="Arial" panose="020B0604020202020204" pitchFamily="34" charset="0"/>
                 </a:rPr>
                 <a:t>Story</a:t>
               </a:r>
@@ -4244,6 +4281,8 @@
                 <a:solidFill>
                   <a:sysClr val="windowText" lastClr="000000"/>
                 </a:solidFill>
+                <a:latin typeface="Arial" panose="020B0604020202020204" pitchFamily="34" charset="0"/>
+                <a:cs typeface="Arial" panose="020B0604020202020204" pitchFamily="34" charset="0"/>
               </a:rPr>
               <a:t>Review &amp; Approval</a:t>
             </a:r>
@@ -4737,7 +4776,7 @@
         <p:spPr>
           <a:xfrm>
             <a:off x="3548023" y="3837859"/>
-            <a:ext cx="927242" cy="646331"/>
+            <a:ext cx="995785" cy="646331"/>
           </a:xfrm>
           <a:prstGeom prst="rect">
             <a:avLst/>
@@ -4757,6 +4796,8 @@
                     <a:lumMod val="75000"/>
                   </a:schemeClr>
                 </a:solidFill>
+                <a:latin typeface="Arial" panose="020B0604020202020204" pitchFamily="34" charset="0"/>
+                <a:cs typeface="Arial" panose="020B0604020202020204" pitchFamily="34" charset="0"/>
               </a:rPr>
               <a:t>Justification</a:t>
             </a:r>
@@ -4769,6 +4810,8 @@
                     <a:lumMod val="75000"/>
                   </a:schemeClr>
                 </a:solidFill>
+                <a:latin typeface="Arial" panose="020B0604020202020204" pitchFamily="34" charset="0"/>
+                <a:cs typeface="Arial" panose="020B0604020202020204" pitchFamily="34" charset="0"/>
               </a:rPr>
               <a:t>- Why us?</a:t>
             </a:r>
@@ -4781,6 +4824,8 @@
                     <a:lumMod val="75000"/>
                   </a:schemeClr>
                 </a:solidFill>
+                <a:latin typeface="Arial" panose="020B0604020202020204" pitchFamily="34" charset="0"/>
+                <a:cs typeface="Arial" panose="020B0604020202020204" pitchFamily="34" charset="0"/>
               </a:rPr>
               <a:t>- Why now?</a:t>
             </a:r>
@@ -4802,7 +4847,7 @@
         <p:spPr>
           <a:xfrm>
             <a:off x="5083671" y="3837859"/>
-            <a:ext cx="858633" cy="646331"/>
+            <a:ext cx="934871" cy="646331"/>
           </a:xfrm>
           <a:prstGeom prst="rect">
             <a:avLst/>
@@ -4822,6 +4867,8 @@
                     <a:lumMod val="75000"/>
                   </a:schemeClr>
                 </a:solidFill>
+                <a:latin typeface="Arial" panose="020B0604020202020204" pitchFamily="34" charset="0"/>
+                <a:cs typeface="Arial" panose="020B0604020202020204" pitchFamily="34" charset="0"/>
               </a:rPr>
               <a:t>Workflows</a:t>
             </a:r>
@@ -4834,6 +4881,8 @@
                     <a:lumMod val="75000"/>
                   </a:schemeClr>
                 </a:solidFill>
+                <a:latin typeface="Arial" panose="020B0604020202020204" pitchFamily="34" charset="0"/>
+                <a:cs typeface="Arial" panose="020B0604020202020204" pitchFamily="34" charset="0"/>
               </a:rPr>
               <a:t>- Current</a:t>
             </a:r>
@@ -4846,6 +4895,8 @@
                     <a:lumMod val="75000"/>
                   </a:schemeClr>
                 </a:solidFill>
+                <a:latin typeface="Arial" panose="020B0604020202020204" pitchFamily="34" charset="0"/>
+                <a:cs typeface="Arial" panose="020B0604020202020204" pitchFamily="34" charset="0"/>
               </a:rPr>
               <a:t>- Proposed</a:t>
             </a:r>
@@ -4867,7 +4918,7 @@
         <p:spPr>
           <a:xfrm>
             <a:off x="6352962" y="3796838"/>
-            <a:ext cx="1379096" cy="276999"/>
+            <a:ext cx="1379096" cy="461665"/>
           </a:xfrm>
           <a:prstGeom prst="rect">
             <a:avLst/>
@@ -4887,6 +4938,8 @@
                     <a:lumMod val="75000"/>
                   </a:schemeClr>
                 </a:solidFill>
+                <a:latin typeface="Arial" panose="020B0604020202020204" pitchFamily="34" charset="0"/>
+                <a:cs typeface="Arial" panose="020B0604020202020204" pitchFamily="34" charset="0"/>
               </a:rPr>
               <a:t>Requirements, KPIs</a:t>
             </a:r>
@@ -4908,7 +4961,7 @@
         <p:spPr>
           <a:xfrm>
             <a:off x="6352962" y="4215028"/>
-            <a:ext cx="2201821" cy="276999"/>
+            <a:ext cx="2386744" cy="276999"/>
           </a:xfrm>
           <a:prstGeom prst="rect">
             <a:avLst/>
@@ -4928,6 +4981,8 @@
                     <a:lumMod val="75000"/>
                   </a:schemeClr>
                 </a:solidFill>
+                <a:latin typeface="Arial" panose="020B0604020202020204" pitchFamily="34" charset="0"/>
+                <a:cs typeface="Arial" panose="020B0604020202020204" pitchFamily="34" charset="0"/>
               </a:rPr>
               <a:t>User stories, Acceptance criteria</a:t>
             </a:r>
@@ -4951,9 +5006,9 @@
           <p:nvPr/>
         </p:nvCxnSpPr>
         <p:spPr>
-          <a:xfrm>
-            <a:off x="7732058" y="3935338"/>
-            <a:ext cx="766658" cy="3965"/>
+          <a:xfrm flipV="1">
+            <a:off x="7732058" y="3939303"/>
+            <a:ext cx="766658" cy="88368"/>
           </a:xfrm>
           <a:prstGeom prst="straightConnector1">
             <a:avLst/>
@@ -4991,8 +5046,8 @@
         </p:nvSpPr>
         <p:spPr>
           <a:xfrm>
-            <a:off x="4411983" y="4662060"/>
-            <a:ext cx="5972469" cy="369332"/>
+            <a:off x="4987248" y="4745882"/>
+            <a:ext cx="4469493" cy="276999"/>
           </a:xfrm>
           <a:prstGeom prst="rect">
             <a:avLst/>
@@ -5006,12 +5061,14 @@
           <a:lstStyle/>
           <a:p>
             <a:r>
-              <a:rPr lang="en-US" dirty="0">
+              <a:rPr lang="en-US" sz="1200" dirty="0">
                 <a:solidFill>
                   <a:schemeClr val="accent1">
                     <a:lumMod val="75000"/>
                   </a:schemeClr>
                 </a:solidFill>
+                <a:latin typeface="Arial" panose="020B0604020202020204" pitchFamily="34" charset="0"/>
+                <a:cs typeface="Arial" panose="020B0604020202020204" pitchFamily="34" charset="0"/>
               </a:rPr>
               <a:t>PRD is a release-sized scope of work, not a strategy document</a:t>
             </a:r>
@@ -5073,8 +5130,8 @@
         </p:nvSpPr>
         <p:spPr>
           <a:xfrm>
-            <a:off x="922027" y="2083533"/>
-            <a:ext cx="1353640" cy="1754326"/>
+            <a:off x="890961" y="2083533"/>
+            <a:ext cx="1415773" cy="1754326"/>
           </a:xfrm>
           <a:prstGeom prst="rect">
             <a:avLst/>
@@ -5095,6 +5152,8 @@
                     <a:lumMod val="75000"/>
                   </a:schemeClr>
                 </a:solidFill>
+                <a:latin typeface="Arial" panose="020B0604020202020204" pitchFamily="34" charset="0"/>
+                <a:cs typeface="Arial" panose="020B0604020202020204" pitchFamily="34" charset="0"/>
               </a:rPr>
               <a:t>Research</a:t>
             </a:r>
@@ -5108,6 +5167,8 @@
                     <a:lumMod val="75000"/>
                   </a:schemeClr>
                 </a:solidFill>
+                <a:latin typeface="Arial" panose="020B0604020202020204" pitchFamily="34" charset="0"/>
+                <a:cs typeface="Arial" panose="020B0604020202020204" pitchFamily="34" charset="0"/>
               </a:rPr>
               <a:t>Customers</a:t>
             </a:r>
@@ -5121,6 +5182,8 @@
                     <a:lumMod val="75000"/>
                   </a:schemeClr>
                 </a:solidFill>
+                <a:latin typeface="Arial" panose="020B0604020202020204" pitchFamily="34" charset="0"/>
+                <a:cs typeface="Arial" panose="020B0604020202020204" pitchFamily="34" charset="0"/>
               </a:rPr>
               <a:t>Competition</a:t>
             </a:r>
@@ -5134,6 +5197,8 @@
                     <a:lumMod val="75000"/>
                   </a:schemeClr>
                 </a:solidFill>
+                <a:latin typeface="Arial" panose="020B0604020202020204" pitchFamily="34" charset="0"/>
+                <a:cs typeface="Arial" panose="020B0604020202020204" pitchFamily="34" charset="0"/>
               </a:rPr>
               <a:t>Roadmaps</a:t>
             </a:r>
@@ -5147,6 +5212,8 @@
                     <a:lumMod val="75000"/>
                   </a:schemeClr>
                 </a:solidFill>
+                <a:latin typeface="Arial" panose="020B0604020202020204" pitchFamily="34" charset="0"/>
+                <a:cs typeface="Arial" panose="020B0604020202020204" pitchFamily="34" charset="0"/>
               </a:rPr>
               <a:t>Vision</a:t>
             </a:r>
@@ -5160,10 +5227,15 @@
                     <a:lumMod val="75000"/>
                   </a:schemeClr>
                 </a:solidFill>
+                <a:latin typeface="Arial" panose="020B0604020202020204" pitchFamily="34" charset="0"/>
+                <a:cs typeface="Arial" panose="020B0604020202020204" pitchFamily="34" charset="0"/>
               </a:rPr>
               <a:t>Strategy</a:t>
             </a:r>
-            <a:endParaRPr lang="en-US" dirty="0"/>
+            <a:endParaRPr lang="en-US" dirty="0">
+              <a:latin typeface="Arial" panose="020B0604020202020204" pitchFamily="34" charset="0"/>
+              <a:cs typeface="Arial" panose="020B0604020202020204" pitchFamily="34" charset="0"/>
+            </a:endParaRPr>
           </a:p>
         </p:txBody>
       </p:sp>

</xml_diff>

<commit_message>
Fix some alignment bugs, font sizes caused by switch to Arial
</commit_message>
<xml_diff>
--- a/images/pm-quarterly-life.pptx
+++ b/images/pm-quarterly-life.pptx
@@ -3351,8 +3351,8 @@
         </p:nvSpPr>
         <p:spPr>
           <a:xfrm>
-            <a:off x="623692" y="1706548"/>
-            <a:ext cx="1956148" cy="3450392"/>
+            <a:off x="638627" y="1932643"/>
+            <a:ext cx="1956148" cy="3107582"/>
           </a:xfrm>
           <a:prstGeom prst="bracketPair">
             <a:avLst/>
@@ -3436,7 +3436,7 @@
         </p:nvSpPr>
         <p:spPr>
           <a:xfrm>
-            <a:off x="3159874" y="1197902"/>
+            <a:off x="3198513" y="1389582"/>
             <a:ext cx="8354860" cy="4078835"/>
           </a:xfrm>
           <a:prstGeom prst="roundRect">
@@ -3498,7 +3498,7 @@
         </p:nvSpPr>
         <p:spPr>
           <a:xfrm>
-            <a:off x="3422921" y="2029875"/>
+            <a:off x="3461560" y="2221555"/>
             <a:ext cx="1177447" cy="447086"/>
           </a:xfrm>
           <a:prstGeom prst="roundRect">
@@ -3554,7 +3554,7 @@
         </p:nvSpPr>
         <p:spPr>
           <a:xfrm>
-            <a:off x="3422921" y="3205457"/>
+            <a:off x="3461560" y="3397137"/>
             <a:ext cx="1177447" cy="447085"/>
           </a:xfrm>
           <a:prstGeom prst="roundRect">
@@ -3607,7 +3607,7 @@
         </p:nvSpPr>
         <p:spPr>
           <a:xfrm>
-            <a:off x="4919108" y="3164996"/>
+            <a:off x="4957747" y="3356676"/>
             <a:ext cx="1177447" cy="528006"/>
           </a:xfrm>
           <a:prstGeom prst="roundRect">
@@ -3673,7 +3673,7 @@
         </p:nvSpPr>
         <p:spPr>
           <a:xfrm>
-            <a:off x="6415295" y="3205457"/>
+            <a:off x="6453934" y="3397137"/>
             <a:ext cx="1177447" cy="447085"/>
           </a:xfrm>
           <a:prstGeom prst="roundRect">
@@ -3726,7 +3726,7 @@
         </p:nvSpPr>
         <p:spPr>
           <a:xfrm>
-            <a:off x="7908732" y="3294754"/>
+            <a:off x="7947371" y="3486434"/>
             <a:ext cx="268494" cy="268490"/>
           </a:xfrm>
           <a:prstGeom prst="ellipse">
@@ -3781,7 +3781,7 @@
         </p:nvGrpSpPr>
         <p:grpSpPr>
           <a:xfrm>
-            <a:off x="8498716" y="2695154"/>
+            <a:off x="8537355" y="2886834"/>
             <a:ext cx="1177448" cy="1467691"/>
             <a:chOff x="8609552" y="2965730"/>
             <a:chExt cx="1177448" cy="1467691"/>
@@ -3961,7 +3961,7 @@
         </p:nvGrpSpPr>
         <p:grpSpPr>
           <a:xfrm>
-            <a:off x="9994905" y="2442776"/>
+            <a:off x="10033544" y="2634456"/>
             <a:ext cx="1177449" cy="1972447"/>
             <a:chOff x="10129376" y="2712072"/>
             <a:chExt cx="1177449" cy="1972447"/>
@@ -4247,7 +4247,7 @@
         </p:nvSpPr>
         <p:spPr>
           <a:xfrm>
-            <a:off x="7457005" y="2029875"/>
+            <a:off x="7495644" y="2221555"/>
             <a:ext cx="1177447" cy="447086"/>
           </a:xfrm>
           <a:prstGeom prst="roundRect">
@@ -4307,7 +4307,7 @@
         </p:nvCxnSpPr>
         <p:spPr>
           <a:xfrm>
-            <a:off x="4011645" y="2476961"/>
+            <a:off x="4050284" y="2668641"/>
             <a:ext cx="0" cy="728496"/>
           </a:xfrm>
           <a:prstGeom prst="straightConnector1">
@@ -4354,7 +4354,7 @@
         </p:nvCxnSpPr>
         <p:spPr>
           <a:xfrm flipH="1">
-            <a:off x="8042979" y="2476961"/>
+            <a:off x="8081618" y="2668641"/>
             <a:ext cx="2750" cy="817793"/>
           </a:xfrm>
           <a:prstGeom prst="straightConnector1">
@@ -4385,49 +4385,6 @@
       </p:cxnSp>
       <p:cxnSp>
         <p:nvCxnSpPr>
-          <p:cNvPr id="33" name="Straight Arrow Connector 32">
-            <a:extLst>
-              <a:ext uri="{FF2B5EF4-FFF2-40B4-BE49-F238E27FC236}">
-                <a16:creationId xmlns:a16="http://schemas.microsoft.com/office/drawing/2014/main" id="{245548E9-2883-E49D-E1FA-C5331805BB1E}"/>
-              </a:ext>
-            </a:extLst>
-          </p:cNvPr>
-          <p:cNvCxnSpPr>
-            <a:cxnSpLocks/>
-            <a:stCxn id="6" idx="3"/>
-            <a:endCxn id="11" idx="1"/>
-          </p:cNvCxnSpPr>
-          <p:nvPr/>
-        </p:nvCxnSpPr>
-        <p:spPr>
-          <a:xfrm flipV="1">
-            <a:off x="2579840" y="3429000"/>
-            <a:ext cx="843081" cy="2744"/>
-          </a:xfrm>
-          <a:prstGeom prst="straightConnector1">
-            <a:avLst/>
-          </a:prstGeom>
-          <a:ln w="22225">
-            <a:tailEnd type="triangle"/>
-          </a:ln>
-        </p:spPr>
-        <p:style>
-          <a:lnRef idx="1">
-            <a:schemeClr val="accent1"/>
-          </a:lnRef>
-          <a:fillRef idx="0">
-            <a:schemeClr val="accent1"/>
-          </a:fillRef>
-          <a:effectRef idx="0">
-            <a:schemeClr val="accent1"/>
-          </a:effectRef>
-          <a:fontRef idx="minor">
-            <a:schemeClr val="tx1"/>
-          </a:fontRef>
-        </p:style>
-      </p:cxnSp>
-      <p:cxnSp>
-        <p:nvCxnSpPr>
           <p:cNvPr id="38" name="Straight Arrow Connector 37">
             <a:extLst>
               <a:ext uri="{FF2B5EF4-FFF2-40B4-BE49-F238E27FC236}">
@@ -4443,7 +4400,7 @@
         </p:nvCxnSpPr>
         <p:spPr>
           <a:xfrm flipV="1">
-            <a:off x="4600368" y="3428999"/>
+            <a:off x="4639007" y="3620679"/>
             <a:ext cx="318740" cy="1"/>
           </a:xfrm>
           <a:prstGeom prst="straightConnector1">
@@ -4485,7 +4442,7 @@
         </p:nvCxnSpPr>
         <p:spPr>
           <a:xfrm>
-            <a:off x="6096555" y="3428999"/>
+            <a:off x="6135194" y="3620679"/>
             <a:ext cx="318740" cy="1"/>
           </a:xfrm>
           <a:prstGeom prst="straightConnector1">
@@ -4527,7 +4484,7 @@
         </p:nvCxnSpPr>
         <p:spPr>
           <a:xfrm flipV="1">
-            <a:off x="7592742" y="3428999"/>
+            <a:off x="7631381" y="3620679"/>
             <a:ext cx="315990" cy="1"/>
           </a:xfrm>
           <a:prstGeom prst="straightConnector1">
@@ -4569,7 +4526,7 @@
         </p:nvCxnSpPr>
         <p:spPr>
           <a:xfrm>
-            <a:off x="8177226" y="3428999"/>
+            <a:off x="8215865" y="3620679"/>
             <a:ext cx="321491" cy="1"/>
           </a:xfrm>
           <a:prstGeom prst="straightConnector1">
@@ -4610,7 +4567,7 @@
         </p:nvCxnSpPr>
         <p:spPr>
           <a:xfrm flipV="1">
-            <a:off x="9676163" y="2569216"/>
+            <a:off x="9714802" y="2760896"/>
             <a:ext cx="318743" cy="310416"/>
           </a:xfrm>
           <a:prstGeom prst="straightConnector1">
@@ -4652,7 +4609,7 @@
         </p:nvCxnSpPr>
         <p:spPr>
           <a:xfrm flipV="1">
-            <a:off x="9676163" y="2913129"/>
+            <a:off x="9714802" y="3104809"/>
             <a:ext cx="318744" cy="5568"/>
           </a:xfrm>
           <a:prstGeom prst="straightConnector1">
@@ -4694,7 +4651,7 @@
         </p:nvCxnSpPr>
         <p:spPr>
           <a:xfrm flipV="1">
-            <a:off x="9676164" y="3257042"/>
+            <a:off x="9714803" y="3448722"/>
             <a:ext cx="318743" cy="171958"/>
           </a:xfrm>
           <a:prstGeom prst="straightConnector1">
@@ -4736,7 +4693,7 @@
         </p:nvCxnSpPr>
         <p:spPr>
           <a:xfrm>
-            <a:off x="9676164" y="3429000"/>
+            <a:off x="9714803" y="3620680"/>
             <a:ext cx="318743" cy="171955"/>
           </a:xfrm>
           <a:prstGeom prst="straightConnector1">
@@ -4775,7 +4732,7 @@
         </p:nvSpPr>
         <p:spPr>
           <a:xfrm>
-            <a:off x="3548023" y="3837859"/>
+            <a:off x="3586662" y="4029539"/>
             <a:ext cx="995785" cy="646331"/>
           </a:xfrm>
           <a:prstGeom prst="rect">
@@ -4846,7 +4803,7 @@
         </p:nvSpPr>
         <p:spPr>
           <a:xfrm>
-            <a:off x="5083671" y="3837859"/>
+            <a:off x="5122310" y="4029539"/>
             <a:ext cx="934871" cy="646331"/>
           </a:xfrm>
           <a:prstGeom prst="rect">
@@ -4917,8 +4874,8 @@
         </p:nvSpPr>
         <p:spPr>
           <a:xfrm>
-            <a:off x="6352962" y="3796838"/>
-            <a:ext cx="1379096" cy="461665"/>
+            <a:off x="6391601" y="3988518"/>
+            <a:ext cx="1542016" cy="276999"/>
           </a:xfrm>
           <a:prstGeom prst="rect">
             <a:avLst/>
@@ -4960,7 +4917,7 @@
         </p:nvSpPr>
         <p:spPr>
           <a:xfrm>
-            <a:off x="6352962" y="4215028"/>
+            <a:off x="6391601" y="4406708"/>
             <a:ext cx="2386744" cy="276999"/>
           </a:xfrm>
           <a:prstGeom prst="rect">
@@ -5006,9 +4963,9 @@
           <p:nvPr/>
         </p:nvCxnSpPr>
         <p:spPr>
-          <a:xfrm flipV="1">
-            <a:off x="7732058" y="3939303"/>
-            <a:ext cx="766658" cy="88368"/>
+          <a:xfrm>
+            <a:off x="7933617" y="4127018"/>
+            <a:ext cx="603738" cy="3965"/>
           </a:xfrm>
           <a:prstGeom prst="straightConnector1">
             <a:avLst/>
@@ -5046,8 +5003,8 @@
         </p:nvSpPr>
         <p:spPr>
           <a:xfrm>
-            <a:off x="4987248" y="4745882"/>
-            <a:ext cx="4469493" cy="276999"/>
+            <a:off x="4419845" y="4885172"/>
+            <a:ext cx="5912196" cy="338554"/>
           </a:xfrm>
           <a:prstGeom prst="rect">
             <a:avLst/>
@@ -5061,7 +5018,7 @@
           <a:lstStyle/>
           <a:p>
             <a:r>
-              <a:rPr lang="en-US" sz="1200" dirty="0">
+              <a:rPr lang="en-US" sz="1600" dirty="0">
                 <a:solidFill>
                   <a:schemeClr val="accent1">
                     <a:lumMod val="75000"/>
@@ -5091,7 +5048,7 @@
         </p:nvCxnSpPr>
         <p:spPr>
           <a:xfrm>
-            <a:off x="10583628" y="3727395"/>
+            <a:off x="10622267" y="3919075"/>
             <a:ext cx="1" cy="434948"/>
           </a:xfrm>
           <a:prstGeom prst="line">
@@ -5130,7 +5087,7 @@
         </p:nvSpPr>
         <p:spPr>
           <a:xfrm>
-            <a:off x="890961" y="2083533"/>
+            <a:off x="912015" y="2081537"/>
             <a:ext cx="1415773" cy="1754326"/>
           </a:xfrm>
           <a:prstGeom prst="rect">
@@ -5236,6 +5193,57 @@
               <a:latin typeface="Arial" panose="020B0604020202020204" pitchFamily="34" charset="0"/>
               <a:cs typeface="Arial" panose="020B0604020202020204" pitchFamily="34" charset="0"/>
             </a:endParaRPr>
+          </a:p>
+        </p:txBody>
+      </p:sp>
+      <p:sp>
+        <p:nvSpPr>
+          <p:cNvPr id="14" name="Right Arrow 13">
+            <a:extLst>
+              <a:ext uri="{FF2B5EF4-FFF2-40B4-BE49-F238E27FC236}">
+                <a16:creationId xmlns:a16="http://schemas.microsoft.com/office/drawing/2014/main" id="{198DEAF5-9652-19F6-F969-C194E462C59F}"/>
+              </a:ext>
+            </a:extLst>
+          </p:cNvPr>
+          <p:cNvSpPr/>
+          <p:nvPr/>
+        </p:nvSpPr>
+        <p:spPr>
+          <a:xfrm>
+            <a:off x="2625626" y="3262132"/>
+            <a:ext cx="820097" cy="728496"/>
+          </a:xfrm>
+          <a:prstGeom prst="rightArrow">
+            <a:avLst/>
+          </a:prstGeom>
+          <a:ln>
+            <a:solidFill>
+              <a:schemeClr val="bg1"/>
+            </a:solidFill>
+          </a:ln>
+        </p:spPr>
+        <p:style>
+          <a:lnRef idx="2">
+            <a:schemeClr val="accent1">
+              <a:shade val="15000"/>
+            </a:schemeClr>
+          </a:lnRef>
+          <a:fillRef idx="1">
+            <a:schemeClr val="accent1"/>
+          </a:fillRef>
+          <a:effectRef idx="0">
+            <a:schemeClr val="accent1"/>
+          </a:effectRef>
+          <a:fontRef idx="minor">
+            <a:schemeClr val="lt1"/>
+          </a:fontRef>
+        </p:style>
+        <p:txBody>
+          <a:bodyPr rtlCol="0" anchor="ctr"/>
+          <a:lstStyle/>
+          <a:p>
+            <a:pPr algn="ctr"/>
+            <a:endParaRPr lang="en-US"/>
           </a:p>
         </p:txBody>
       </p:sp>

</xml_diff>

<commit_message>
Feature Narratives are supposed by workflow _focused_...
</commit_message>
<xml_diff>
--- a/images/pm-quarterly-life.pptx
+++ b/images/pm-quarterly-life.pptx
@@ -4732,7 +4732,7 @@
         </p:nvSpPr>
         <p:spPr>
           <a:xfrm>
-            <a:off x="3586662" y="4029539"/>
+            <a:off x="3586662" y="3989404"/>
             <a:ext cx="995785" cy="646331"/>
           </a:xfrm>
           <a:prstGeom prst="rect">
@@ -4803,8 +4803,8 @@
         </p:nvSpPr>
         <p:spPr>
           <a:xfrm>
-            <a:off x="5122310" y="4029539"/>
-            <a:ext cx="934871" cy="646331"/>
+            <a:off x="4892770" y="3991488"/>
+            <a:ext cx="1401794" cy="646331"/>
           </a:xfrm>
           <a:prstGeom prst="rect">
             <a:avLst/>
@@ -4827,7 +4827,7 @@
                 <a:latin typeface="Arial" panose="020B0604020202020204" pitchFamily="34" charset="0"/>
                 <a:cs typeface="Arial" panose="020B0604020202020204" pitchFamily="34" charset="0"/>
               </a:rPr>
-              <a:t>Workflows</a:t>
+              <a:t>Workflow focused</a:t>
             </a:r>
           </a:p>
           <a:p>

</xml_diff>